<commit_message>
Changed presentation a bit
</commit_message>
<xml_diff>
--- a/Documents/Inventory management system.pptx
+++ b/Documents/Inventory management system.pptx
@@ -5,16 +5,17 @@
     <p:sldMasterId id="2147483673" r:id="rId1"/>
   </p:sldMasterIdLst>
   <p:notesMasterIdLst>
-    <p:notesMasterId r:id="rId6"/>
+    <p:notesMasterId r:id="rId7"/>
   </p:notesMasterIdLst>
   <p:handoutMasterIdLst>
-    <p:handoutMasterId r:id="rId7"/>
+    <p:handoutMasterId r:id="rId8"/>
   </p:handoutMasterIdLst>
   <p:sldIdLst>
     <p:sldId id="257" r:id="rId2"/>
     <p:sldId id="258" r:id="rId3"/>
-    <p:sldId id="259" r:id="rId4"/>
-    <p:sldId id="260" r:id="rId5"/>
+    <p:sldId id="261" r:id="rId4"/>
+    <p:sldId id="259" r:id="rId5"/>
+    <p:sldId id="260" r:id="rId6"/>
   </p:sldIdLst>
   <p:sldSz cx="12192000" cy="6858000"/>
   <p:notesSz cx="6858000" cy="9144000"/>
@@ -5196,7 +5197,7 @@
           <a:p>
             <a:r>
               <a:rPr lang="uk-UA" dirty="0"/>
-              <a:t>Ціль аплікації</a:t>
+              <a:t>Технічний стек</a:t>
             </a:r>
           </a:p>
         </p:txBody>
@@ -5225,130 +5226,26 @@
           <a:lstStyle/>
           <a:p>
             <a:r>
-              <a:rPr lang="ru-RU" sz="2000" dirty="0"/>
-              <a:t>Система </a:t>
-            </a:r>
-            <a:r>
-              <a:rPr lang="ru-RU" sz="2000" dirty="0" err="1"/>
-              <a:t>інвентаризації</a:t>
-            </a:r>
-            <a:r>
-              <a:rPr lang="ru-RU" sz="2000" dirty="0"/>
-              <a:t> </a:t>
-            </a:r>
-            <a:r>
-              <a:rPr lang="ru-RU" sz="2000" dirty="0" err="1"/>
-              <a:t>має</a:t>
-            </a:r>
-            <a:r>
-              <a:rPr lang="ru-RU" sz="2000" dirty="0"/>
-              <a:t> на </a:t>
-            </a:r>
-            <a:r>
-              <a:rPr lang="ru-RU" sz="2000" dirty="0" err="1"/>
-              <a:t>меті</a:t>
-            </a:r>
-            <a:r>
-              <a:rPr lang="ru-RU" sz="2000" dirty="0"/>
-              <a:t> </a:t>
-            </a:r>
-            <a:r>
-              <a:rPr lang="ru-RU" sz="2000" dirty="0" err="1"/>
-              <a:t>вирішити</a:t>
-            </a:r>
-            <a:r>
-              <a:rPr lang="ru-RU" sz="2000" dirty="0"/>
-              <a:t> </a:t>
-            </a:r>
-            <a:r>
-              <a:rPr lang="ru-RU" sz="2000" dirty="0" err="1"/>
-              <a:t>проблеми</a:t>
-            </a:r>
-            <a:r>
-              <a:rPr lang="ru-RU" sz="2000" dirty="0"/>
-              <a:t>, </a:t>
-            </a:r>
-            <a:r>
-              <a:rPr lang="ru-RU" sz="2000" dirty="0" err="1"/>
-              <a:t>пов'язані</a:t>
-            </a:r>
-            <a:r>
-              <a:rPr lang="ru-RU" sz="2000" dirty="0"/>
-              <a:t> з </a:t>
-            </a:r>
-            <a:r>
-              <a:rPr lang="ru-RU" sz="2000" dirty="0" err="1"/>
-              <a:t>управлінням</a:t>
-            </a:r>
-            <a:r>
-              <a:rPr lang="ru-RU" sz="2000" dirty="0"/>
-              <a:t> запасами, </a:t>
-            </a:r>
-            <a:r>
-              <a:rPr lang="ru-RU" sz="2000" dirty="0" err="1"/>
-              <a:t>постачаннями</a:t>
-            </a:r>
-            <a:r>
-              <a:rPr lang="ru-RU" sz="2000" dirty="0"/>
-              <a:t> та </a:t>
-            </a:r>
-            <a:r>
-              <a:rPr lang="ru-RU" sz="2000" dirty="0" err="1"/>
-              <a:t>замовленнями</a:t>
-            </a:r>
-            <a:r>
-              <a:rPr lang="ru-RU" sz="2000" dirty="0"/>
-              <a:t> </a:t>
-            </a:r>
-            <a:r>
-              <a:rPr lang="ru-RU" sz="2000" dirty="0" err="1"/>
-              <a:t>товарів</a:t>
-            </a:r>
-            <a:r>
-              <a:rPr lang="ru-RU" sz="2000" dirty="0"/>
-              <a:t>.</a:t>
-            </a:r>
-            <a:endParaRPr lang="en-US" sz="2000" dirty="0"/>
-          </a:p>
-          <a:p>
-            <a:pPr marL="0" indent="0">
-              <a:buNone/>
-            </a:pPr>
-            <a:endParaRPr lang="ru-RU" sz="2000" dirty="0"/>
-          </a:p>
-          <a:p>
-            <a:r>
-              <a:rPr lang="ru-RU" sz="2000" dirty="0"/>
-              <a:t>Типи </a:t>
-            </a:r>
-            <a:r>
-              <a:rPr lang="ru-RU" sz="2000" dirty="0" err="1"/>
-              <a:t>користувачів</a:t>
-            </a:r>
-            <a:r>
-              <a:rPr lang="en-US" sz="2000" dirty="0"/>
-              <a:t>:</a:t>
-            </a:r>
-          </a:p>
-          <a:p>
-            <a:pPr lvl="1"/>
+              <a:rPr lang="en-US" sz="1800" dirty="0"/>
+              <a:t>Windows Presentation Foundation (WPF) – </a:t>
+            </a:r>
             <a:r>
               <a:rPr lang="uk-UA" sz="1800" dirty="0"/>
-              <a:t>власники бізнесу</a:t>
-            </a:r>
-          </a:p>
-          <a:p>
-            <a:pPr lvl="1"/>
+              <a:t>бібліотека для створення </a:t>
+            </a:r>
+            <a:r>
+              <a:rPr lang="en-US" sz="1800" dirty="0"/>
+              <a:t>UI</a:t>
+            </a:r>
+          </a:p>
+          <a:p>
+            <a:r>
+              <a:rPr lang="en-US" sz="1800" dirty="0"/>
+              <a:t>Entity Framework  Core – </a:t>
+            </a:r>
             <a:r>
               <a:rPr lang="uk-UA" sz="1800" dirty="0"/>
-              <a:t>менеджери</a:t>
-            </a:r>
-          </a:p>
-          <a:p>
-            <a:pPr lvl="1"/>
-            <a:r>
-              <a:rPr lang="uk-UA" sz="1800" dirty="0"/>
-              <a:t>працівники складу</a:t>
+              <a:t>бібліотека для роботи із базами даних</a:t>
             </a:r>
           </a:p>
         </p:txBody>
@@ -5388,6 +5285,215 @@
           <p:cNvPr id="2" name="Заголовок 1">
             <a:extLst>
               <a:ext uri="{FF2B5EF4-FFF2-40B4-BE49-F238E27FC236}">
+                <a16:creationId xmlns:a16="http://schemas.microsoft.com/office/drawing/2014/main" id="{20FDADFB-AF8E-DA0D-8D04-C14041EDB691}"/>
+              </a:ext>
+            </a:extLst>
+          </p:cNvPr>
+          <p:cNvSpPr>
+            <a:spLocks noGrp="1"/>
+          </p:cNvSpPr>
+          <p:nvPr>
+            <p:ph type="title"/>
+          </p:nvPr>
+        </p:nvSpPr>
+        <p:spPr/>
+        <p:txBody>
+          <a:bodyPr/>
+          <a:lstStyle/>
+          <a:p>
+            <a:r>
+              <a:rPr lang="uk-UA" dirty="0"/>
+              <a:t>Ціль аплікації</a:t>
+            </a:r>
+          </a:p>
+        </p:txBody>
+      </p:sp>
+      <p:sp>
+        <p:nvSpPr>
+          <p:cNvPr id="3" name="Місце для вмісту 2">
+            <a:extLst>
+              <a:ext uri="{FF2B5EF4-FFF2-40B4-BE49-F238E27FC236}">
+                <a16:creationId xmlns:a16="http://schemas.microsoft.com/office/drawing/2014/main" id="{762F36BD-8B77-C423-5950-4423A3E1DFF8}"/>
+              </a:ext>
+            </a:extLst>
+          </p:cNvPr>
+          <p:cNvSpPr>
+            <a:spLocks noGrp="1"/>
+          </p:cNvSpPr>
+          <p:nvPr>
+            <p:ph idx="1"/>
+          </p:nvPr>
+        </p:nvSpPr>
+        <p:spPr/>
+        <p:txBody>
+          <a:bodyPr>
+            <a:normAutofit/>
+          </a:bodyPr>
+          <a:lstStyle/>
+          <a:p>
+            <a:r>
+              <a:rPr lang="ru-RU" sz="2000" dirty="0"/>
+              <a:t>Система </a:t>
+            </a:r>
+            <a:r>
+              <a:rPr lang="ru-RU" sz="2000" dirty="0" err="1"/>
+              <a:t>інвентаризації</a:t>
+            </a:r>
+            <a:r>
+              <a:rPr lang="ru-RU" sz="2000" dirty="0"/>
+              <a:t> </a:t>
+            </a:r>
+            <a:r>
+              <a:rPr lang="ru-RU" sz="2000" dirty="0" err="1"/>
+              <a:t>має</a:t>
+            </a:r>
+            <a:r>
+              <a:rPr lang="ru-RU" sz="2000" dirty="0"/>
+              <a:t> на </a:t>
+            </a:r>
+            <a:r>
+              <a:rPr lang="ru-RU" sz="2000" dirty="0" err="1"/>
+              <a:t>меті</a:t>
+            </a:r>
+            <a:r>
+              <a:rPr lang="ru-RU" sz="2000" dirty="0"/>
+              <a:t> </a:t>
+            </a:r>
+            <a:r>
+              <a:rPr lang="ru-RU" sz="2000" dirty="0" err="1"/>
+              <a:t>вирішити</a:t>
+            </a:r>
+            <a:r>
+              <a:rPr lang="ru-RU" sz="2000" dirty="0"/>
+              <a:t> </a:t>
+            </a:r>
+            <a:r>
+              <a:rPr lang="ru-RU" sz="2000" dirty="0" err="1"/>
+              <a:t>проблеми</a:t>
+            </a:r>
+            <a:r>
+              <a:rPr lang="ru-RU" sz="2000" dirty="0"/>
+              <a:t>, </a:t>
+            </a:r>
+            <a:r>
+              <a:rPr lang="ru-RU" sz="2000" dirty="0" err="1"/>
+              <a:t>пов'язані</a:t>
+            </a:r>
+            <a:r>
+              <a:rPr lang="ru-RU" sz="2000" dirty="0"/>
+              <a:t> з </a:t>
+            </a:r>
+            <a:r>
+              <a:rPr lang="ru-RU" sz="2000" dirty="0" err="1"/>
+              <a:t>управлінням</a:t>
+            </a:r>
+            <a:r>
+              <a:rPr lang="ru-RU" sz="2000" dirty="0"/>
+              <a:t> запасами, </a:t>
+            </a:r>
+            <a:r>
+              <a:rPr lang="ru-RU" sz="2000" dirty="0" err="1"/>
+              <a:t>постачаннями</a:t>
+            </a:r>
+            <a:r>
+              <a:rPr lang="ru-RU" sz="2000" dirty="0"/>
+              <a:t> та </a:t>
+            </a:r>
+            <a:r>
+              <a:rPr lang="ru-RU" sz="2000" dirty="0" err="1"/>
+              <a:t>замовленнями</a:t>
+            </a:r>
+            <a:r>
+              <a:rPr lang="ru-RU" sz="2000" dirty="0"/>
+              <a:t> </a:t>
+            </a:r>
+            <a:r>
+              <a:rPr lang="ru-RU" sz="2000" dirty="0" err="1"/>
+              <a:t>товарів</a:t>
+            </a:r>
+            <a:r>
+              <a:rPr lang="ru-RU" sz="2000" dirty="0"/>
+              <a:t>.</a:t>
+            </a:r>
+          </a:p>
+          <a:p>
+            <a:pPr marL="0" indent="0">
+              <a:buNone/>
+            </a:pPr>
+            <a:endParaRPr lang="ru-RU" sz="2000" dirty="0"/>
+          </a:p>
+          <a:p>
+            <a:r>
+              <a:rPr lang="ru-RU" sz="2000" dirty="0"/>
+              <a:t>Типи </a:t>
+            </a:r>
+            <a:r>
+              <a:rPr lang="ru-RU" sz="2000" dirty="0" err="1"/>
+              <a:t>користувачів</a:t>
+            </a:r>
+            <a:r>
+              <a:rPr lang="en-US" sz="2000" dirty="0"/>
+              <a:t>:</a:t>
+            </a:r>
+          </a:p>
+          <a:p>
+            <a:pPr lvl="1"/>
+            <a:r>
+              <a:rPr lang="uk-UA" sz="1800" dirty="0"/>
+              <a:t>власники бізнесу</a:t>
+            </a:r>
+          </a:p>
+          <a:p>
+            <a:pPr lvl="1"/>
+            <a:r>
+              <a:rPr lang="uk-UA" sz="1800" dirty="0"/>
+              <a:t>менеджери</a:t>
+            </a:r>
+          </a:p>
+          <a:p>
+            <a:pPr lvl="1"/>
+            <a:r>
+              <a:rPr lang="uk-UA" sz="1800" dirty="0"/>
+              <a:t>працівники складу</a:t>
+            </a:r>
+          </a:p>
+        </p:txBody>
+      </p:sp>
+    </p:spTree>
+    <p:extLst>
+      <p:ext uri="{BB962C8B-B14F-4D97-AF65-F5344CB8AC3E}">
+        <p14:creationId xmlns:p14="http://schemas.microsoft.com/office/powerpoint/2010/main" val="373035715"/>
+      </p:ext>
+    </p:extLst>
+  </p:cSld>
+  <p:clrMapOvr>
+    <a:masterClrMapping/>
+  </p:clrMapOvr>
+</p:sld>
+</file>
+
+<file path=ppt/slides/slide4.xml><?xml version="1.0" encoding="utf-8"?>
+<p:sld xmlns:a="http://schemas.openxmlformats.org/drawingml/2006/main" xmlns:r="http://schemas.openxmlformats.org/officeDocument/2006/relationships" xmlns:p="http://schemas.openxmlformats.org/presentationml/2006/main">
+  <p:cSld>
+    <p:spTree>
+      <p:nvGrpSpPr>
+        <p:cNvPr id="1" name=""/>
+        <p:cNvGrpSpPr/>
+        <p:nvPr/>
+      </p:nvGrpSpPr>
+      <p:grpSpPr>
+        <a:xfrm>
+          <a:off x="0" y="0"/>
+          <a:ext cx="0" cy="0"/>
+          <a:chOff x="0" y="0"/>
+          <a:chExt cx="0" cy="0"/>
+        </a:xfrm>
+      </p:grpSpPr>
+      <p:sp>
+        <p:nvSpPr>
+          <p:cNvPr id="2" name="Заголовок 1">
+            <a:extLst>
+              <a:ext uri="{FF2B5EF4-FFF2-40B4-BE49-F238E27FC236}">
                 <a16:creationId xmlns:a16="http://schemas.microsoft.com/office/drawing/2014/main" id="{1105AA78-CD98-D027-C610-D478209C629D}"/>
               </a:ext>
             </a:extLst>
@@ -5640,7 +5746,7 @@
 </p:sld>
 </file>
 
-<file path=ppt/slides/slide4.xml><?xml version="1.0" encoding="utf-8"?>
+<file path=ppt/slides/slide5.xml><?xml version="1.0" encoding="utf-8"?>
 <p:sld xmlns:a="http://schemas.openxmlformats.org/drawingml/2006/main" xmlns:r="http://schemas.openxmlformats.org/officeDocument/2006/relationships" xmlns:p="http://schemas.openxmlformats.org/presentationml/2006/main">
   <p:cSld>
     <p:spTree>

</xml_diff>